<commit_message>
preceptron 1D single hidden layer
</commit_message>
<xml_diff>
--- a/Slides_4.pptx
+++ b/Slides_4.pptx
@@ -8,9 +8,10 @@
     <p:sldId id="256" r:id="rId2"/>
     <p:sldId id="264" r:id="rId3"/>
     <p:sldId id="262" r:id="rId4"/>
-    <p:sldId id="258" r:id="rId5"/>
-    <p:sldId id="260" r:id="rId6"/>
-    <p:sldId id="259" r:id="rId7"/>
+    <p:sldId id="263" r:id="rId5"/>
+    <p:sldId id="258" r:id="rId6"/>
+    <p:sldId id="260" r:id="rId7"/>
+    <p:sldId id="259" r:id="rId8"/>
   </p:sldIdLst>
   <p:sldSz cx="12192000" cy="6858000"/>
   <p:notesSz cx="6858000" cy="9144000"/>
@@ -4164,7 +4165,7 @@
           <p:cNvPr id="2" name="Title 1">
             <a:extLst>
               <a:ext uri="{FF2B5EF4-FFF2-40B4-BE49-F238E27FC236}">
-                <a16:creationId xmlns:a16="http://schemas.microsoft.com/office/drawing/2014/main" id="{52E5C877-FCC4-8B10-50C2-924FFD68CD9A}"/>
+                <a16:creationId xmlns:a16="http://schemas.microsoft.com/office/drawing/2014/main" id="{A29535A4-D8A7-EBBA-1095-BF26A087E7E9}"/>
               </a:ext>
             </a:extLst>
           </p:cNvPr>
@@ -4182,46 +4183,413 @@
           <a:p>
             <a:r>
               <a:rPr lang="en-US" dirty="0"/>
-              <a:t>Convolutional layer</a:t>
-            </a:r>
-          </a:p>
-        </p:txBody>
-      </p:sp>
-      <p:sp>
-        <p:nvSpPr>
-          <p:cNvPr id="3" name="Content Placeholder 2">
-            <a:extLst>
-              <a:ext uri="{FF2B5EF4-FFF2-40B4-BE49-F238E27FC236}">
-                <a16:creationId xmlns:a16="http://schemas.microsoft.com/office/drawing/2014/main" id="{98167828-7134-6384-2712-0B3A039FCF08}"/>
-              </a:ext>
-            </a:extLst>
-          </p:cNvPr>
-          <p:cNvSpPr>
-            <a:spLocks noGrp="1"/>
-          </p:cNvSpPr>
-          <p:nvPr>
-            <p:ph idx="1"/>
-          </p:nvPr>
-        </p:nvSpPr>
-        <p:spPr/>
-        <p:txBody>
-          <a:bodyPr/>
-          <a:lstStyle/>
-          <a:p>
-            <a:endParaRPr lang="en-US"/>
+              <a:t>1D </a:t>
+            </a:r>
+            <a:r>
+              <a:rPr lang="fr-FR" dirty="0"/>
+              <a:t>perceptron</a:t>
+            </a:r>
+            <a:endParaRPr lang="en-US" dirty="0"/>
+          </a:p>
+        </p:txBody>
+      </p:sp>
+      <mc:AlternateContent xmlns:mc="http://schemas.openxmlformats.org/markup-compatibility/2006">
+        <mc:Choice xmlns:a14="http://schemas.microsoft.com/office/drawing/2010/main" Requires="a14">
+          <p:sp>
+            <p:nvSpPr>
+              <p:cNvPr id="3" name="TextBox 2">
+                <a:extLst>
+                  <a:ext uri="{FF2B5EF4-FFF2-40B4-BE49-F238E27FC236}">
+                    <a16:creationId xmlns:a16="http://schemas.microsoft.com/office/drawing/2014/main" id="{5C6506F2-F170-9A0B-C11A-FFE7BE2B740B}"/>
+                  </a:ext>
+                </a:extLst>
+              </p:cNvPr>
+              <p:cNvSpPr txBox="1"/>
+              <p:nvPr/>
+            </p:nvSpPr>
+            <p:spPr>
+              <a:xfrm>
+                <a:off x="2862471" y="3462457"/>
+                <a:ext cx="548099" cy="646331"/>
+              </a:xfrm>
+              <a:prstGeom prst="rect">
+                <a:avLst/>
+              </a:prstGeom>
+              <a:noFill/>
+            </p:spPr>
+            <p:txBody>
+              <a:bodyPr wrap="none" rtlCol="0">
+                <a:spAutoFit/>
+              </a:bodyPr>
+              <a:lstStyle/>
+              <a:p>
+                <a14:m>
+                  <m:oMathPara xmlns:m="http://schemas.openxmlformats.org/officeDocument/2006/math">
+                    <m:oMathParaPr>
+                      <m:jc m:val="centerGroup"/>
+                    </m:oMathParaPr>
+                    <m:oMath xmlns:m="http://schemas.openxmlformats.org/officeDocument/2006/math">
+                      <m:r>
+                        <a:rPr lang="en-US" sz="3600" b="0" i="1" smtClean="0">
+                          <a:latin typeface="Cambria Math" panose="02040503050406030204" pitchFamily="18" charset="0"/>
+                        </a:rPr>
+                        <m:t>𝑥</m:t>
+                      </m:r>
+                    </m:oMath>
+                  </m:oMathPara>
+                </a14:m>
+                <a:endParaRPr lang="en-US" dirty="0"/>
+              </a:p>
+            </p:txBody>
+          </p:sp>
+        </mc:Choice>
+        <mc:Fallback>
+          <p:sp>
+            <p:nvSpPr>
+              <p:cNvPr id="3" name="TextBox 2">
+                <a:extLst>
+                  <a:ext uri="{FF2B5EF4-FFF2-40B4-BE49-F238E27FC236}">
+                    <a16:creationId xmlns:a16="http://schemas.microsoft.com/office/drawing/2014/main" id="{5C6506F2-F170-9A0B-C11A-FFE7BE2B740B}"/>
+                  </a:ext>
+                </a:extLst>
+              </p:cNvPr>
+              <p:cNvSpPr txBox="1">
+                <a:spLocks noRot="1" noChangeAspect="1" noMove="1" noResize="1" noEditPoints="1" noAdjustHandles="1" noChangeArrowheads="1" noChangeShapeType="1" noTextEdit="1"/>
+              </p:cNvSpPr>
+              <p:nvPr/>
+            </p:nvSpPr>
+            <p:spPr>
+              <a:xfrm>
+                <a:off x="2862471" y="3462457"/>
+                <a:ext cx="548099" cy="646331"/>
+              </a:xfrm>
+              <a:prstGeom prst="rect">
+                <a:avLst/>
+              </a:prstGeom>
+              <a:blipFill>
+                <a:blip r:embed="rId2"/>
+                <a:stretch>
+                  <a:fillRect/>
+                </a:stretch>
+              </a:blipFill>
+            </p:spPr>
+            <p:txBody>
+              <a:bodyPr/>
+              <a:lstStyle/>
+              <a:p>
+                <a:r>
+                  <a:rPr lang="en-US">
+                    <a:noFill/>
+                  </a:rPr>
+                  <a:t> </a:t>
+                </a:r>
+              </a:p>
+            </p:txBody>
+          </p:sp>
+        </mc:Fallback>
+      </mc:AlternateContent>
+      <mc:AlternateContent xmlns:mc="http://schemas.openxmlformats.org/markup-compatibility/2006">
+        <mc:Choice xmlns:a14="http://schemas.microsoft.com/office/drawing/2010/main" Requires="a14">
+          <p:sp>
+            <p:nvSpPr>
+              <p:cNvPr id="4" name="TextBox 3">
+                <a:extLst>
+                  <a:ext uri="{FF2B5EF4-FFF2-40B4-BE49-F238E27FC236}">
+                    <a16:creationId xmlns:a16="http://schemas.microsoft.com/office/drawing/2014/main" id="{7608343D-2595-6697-17C5-C3800AB12E5A}"/>
+                  </a:ext>
+                </a:extLst>
+              </p:cNvPr>
+              <p:cNvSpPr txBox="1"/>
+              <p:nvPr/>
+            </p:nvSpPr>
+            <p:spPr>
+              <a:xfrm>
+                <a:off x="8910388" y="3462457"/>
+                <a:ext cx="554832" cy="646331"/>
+              </a:xfrm>
+              <a:prstGeom prst="rect">
+                <a:avLst/>
+              </a:prstGeom>
+              <a:noFill/>
+            </p:spPr>
+            <p:txBody>
+              <a:bodyPr wrap="none" rtlCol="0">
+                <a:spAutoFit/>
+              </a:bodyPr>
+              <a:lstStyle/>
+              <a:p>
+                <a14:m>
+                  <m:oMathPara xmlns:m="http://schemas.openxmlformats.org/officeDocument/2006/math">
+                    <m:oMathParaPr>
+                      <m:jc m:val="centerGroup"/>
+                    </m:oMathParaPr>
+                    <m:oMath xmlns:m="http://schemas.openxmlformats.org/officeDocument/2006/math">
+                      <m:r>
+                        <a:rPr lang="en-US" sz="3600" b="0" i="1" smtClean="0">
+                          <a:latin typeface="Cambria Math" panose="02040503050406030204" pitchFamily="18" charset="0"/>
+                        </a:rPr>
+                        <m:t>𝑦</m:t>
+                      </m:r>
+                    </m:oMath>
+                  </m:oMathPara>
+                </a14:m>
+                <a:endParaRPr lang="en-US" sz="3600" dirty="0"/>
+              </a:p>
+            </p:txBody>
+          </p:sp>
+        </mc:Choice>
+        <mc:Fallback>
+          <p:sp>
+            <p:nvSpPr>
+              <p:cNvPr id="4" name="TextBox 3">
+                <a:extLst>
+                  <a:ext uri="{FF2B5EF4-FFF2-40B4-BE49-F238E27FC236}">
+                    <a16:creationId xmlns:a16="http://schemas.microsoft.com/office/drawing/2014/main" id="{7608343D-2595-6697-17C5-C3800AB12E5A}"/>
+                  </a:ext>
+                </a:extLst>
+              </p:cNvPr>
+              <p:cNvSpPr txBox="1">
+                <a:spLocks noRot="1" noChangeAspect="1" noMove="1" noResize="1" noEditPoints="1" noAdjustHandles="1" noChangeArrowheads="1" noChangeShapeType="1" noTextEdit="1"/>
+              </p:cNvSpPr>
+              <p:nvPr/>
+            </p:nvSpPr>
+            <p:spPr>
+              <a:xfrm>
+                <a:off x="8910388" y="3462457"/>
+                <a:ext cx="554832" cy="646331"/>
+              </a:xfrm>
+              <a:prstGeom prst="rect">
+                <a:avLst/>
+              </a:prstGeom>
+              <a:blipFill>
+                <a:blip r:embed="rId3"/>
+                <a:stretch>
+                  <a:fillRect/>
+                </a:stretch>
+              </a:blipFill>
+            </p:spPr>
+            <p:txBody>
+              <a:bodyPr/>
+              <a:lstStyle/>
+              <a:p>
+                <a:r>
+                  <a:rPr lang="en-US">
+                    <a:noFill/>
+                  </a:rPr>
+                  <a:t> </a:t>
+                </a:r>
+              </a:p>
+            </p:txBody>
+          </p:sp>
+        </mc:Fallback>
+      </mc:AlternateContent>
+      <p:pic>
+        <p:nvPicPr>
+          <p:cNvPr id="8" name="Graphic 7">
+            <a:extLst>
+              <a:ext uri="{FF2B5EF4-FFF2-40B4-BE49-F238E27FC236}">
+                <a16:creationId xmlns:a16="http://schemas.microsoft.com/office/drawing/2014/main" id="{08BC5108-E200-F61F-FB05-13DB73E4D4A1}"/>
+              </a:ext>
+            </a:extLst>
+          </p:cNvPr>
+          <p:cNvPicPr>
+            <a:picLocks noChangeAspect="1"/>
+          </p:cNvPicPr>
+          <p:nvPr/>
+        </p:nvPicPr>
+        <p:blipFill>
+          <a:blip r:embed="rId4">
+            <a:extLst>
+              <a:ext uri="{28A0092B-C50C-407E-A947-70E740481C1C}">
+                <a14:useLocalDpi xmlns:a14="http://schemas.microsoft.com/office/drawing/2010/main" val="0"/>
+              </a:ext>
+              <a:ext uri="{96DAC541-7B7A-43D3-8B79-37D633B846F1}">
+                <asvg:svgBlip xmlns:asvg="http://schemas.microsoft.com/office/drawing/2016/SVG/main" r:embed="rId5"/>
+              </a:ext>
+            </a:extLst>
+          </a:blip>
+          <a:stretch>
+            <a:fillRect/>
+          </a:stretch>
+        </p:blipFill>
+        <p:spPr>
+          <a:xfrm>
+            <a:off x="4407884" y="1401763"/>
+            <a:ext cx="3376232" cy="4775200"/>
+          </a:xfrm>
+          <a:prstGeom prst="rect">
+            <a:avLst/>
+          </a:prstGeom>
+        </p:spPr>
+      </p:pic>
+      <p:sp>
+        <p:nvSpPr>
+          <p:cNvPr id="11" name="TextBox 10">
+            <a:extLst>
+              <a:ext uri="{FF2B5EF4-FFF2-40B4-BE49-F238E27FC236}">
+                <a16:creationId xmlns:a16="http://schemas.microsoft.com/office/drawing/2014/main" id="{116C7DE0-C8BD-A9C4-2FDA-3D10A42710C9}"/>
+              </a:ext>
+            </a:extLst>
+          </p:cNvPr>
+          <p:cNvSpPr txBox="1"/>
+          <p:nvPr/>
+        </p:nvSpPr>
+        <p:spPr>
+          <a:xfrm>
+            <a:off x="838200" y="6204635"/>
+            <a:ext cx="10515600" cy="369332"/>
+          </a:xfrm>
+          <a:prstGeom prst="rect">
+            <a:avLst/>
+          </a:prstGeom>
+          <a:noFill/>
+        </p:spPr>
+        <p:txBody>
+          <a:bodyPr wrap="square">
+            <a:spAutoFit/>
+          </a:bodyPr>
+          <a:lstStyle/>
+          <a:p>
+            <a:pPr algn="ctr"/>
+            <a:r>
+              <a:rPr lang="en-US" dirty="0"/>
+              <a:t>“any continuous function can be approximated by a 2 layers perceptron” (with ReLU activation)</a:t>
+            </a:r>
+          </a:p>
+        </p:txBody>
+      </p:sp>
+      <p:sp>
+        <p:nvSpPr>
+          <p:cNvPr id="12" name="TextBox 11">
+            <a:extLst>
+              <a:ext uri="{FF2B5EF4-FFF2-40B4-BE49-F238E27FC236}">
+                <a16:creationId xmlns:a16="http://schemas.microsoft.com/office/drawing/2014/main" id="{0BD58561-E49E-71DB-38CF-F025364B1139}"/>
+              </a:ext>
+            </a:extLst>
+          </p:cNvPr>
+          <p:cNvSpPr txBox="1"/>
+          <p:nvPr/>
+        </p:nvSpPr>
+        <p:spPr>
+          <a:xfrm>
+            <a:off x="838200" y="6492875"/>
+            <a:ext cx="10515600" cy="369332"/>
+          </a:xfrm>
+          <a:prstGeom prst="rect">
+            <a:avLst/>
+          </a:prstGeom>
+          <a:noFill/>
+        </p:spPr>
+        <p:txBody>
+          <a:bodyPr wrap="square">
+            <a:spAutoFit/>
+          </a:bodyPr>
+          <a:lstStyle/>
+          <a:p>
+            <a:pPr algn="ctr"/>
+            <a:r>
+              <a:rPr lang="en-US" dirty="0"/>
+              <a:t>… provided there are enough neurons in the middle layer!</a:t>
+            </a:r>
           </a:p>
         </p:txBody>
       </p:sp>
     </p:spTree>
     <p:extLst>
       <p:ext uri="{BB962C8B-B14F-4D97-AF65-F5344CB8AC3E}">
-        <p14:creationId xmlns:p14="http://schemas.microsoft.com/office/powerpoint/2010/main" val="3173564647"/>
+        <p14:creationId xmlns:p14="http://schemas.microsoft.com/office/powerpoint/2010/main" val="954690009"/>
       </p:ext>
     </p:extLst>
   </p:cSld>
   <p:clrMapOvr>
     <a:masterClrMapping/>
   </p:clrMapOvr>
+  <p:timing>
+    <p:tnLst>
+      <p:par>
+        <p:cTn id="1" dur="indefinite" restart="never" nodeType="tmRoot">
+          <p:childTnLst>
+            <p:seq concurrent="1" nextAc="seek">
+              <p:cTn id="2" dur="indefinite" nodeType="mainSeq">
+                <p:childTnLst>
+                  <p:par>
+                    <p:cTn id="3" fill="hold">
+                      <p:stCondLst>
+                        <p:cond delay="indefinite"/>
+                      </p:stCondLst>
+                      <p:childTnLst>
+                        <p:par>
+                          <p:cTn id="4" fill="hold">
+                            <p:stCondLst>
+                              <p:cond delay="0"/>
+                            </p:stCondLst>
+                            <p:childTnLst>
+                              <p:par>
+                                <p:cTn id="5" presetID="10" presetClass="entr" presetSubtype="0" fill="hold" grpId="0" nodeType="clickEffect">
+                                  <p:stCondLst>
+                                    <p:cond delay="0"/>
+                                  </p:stCondLst>
+                                  <p:childTnLst>
+                                    <p:set>
+                                      <p:cBhvr>
+                                        <p:cTn id="6" dur="1" fill="hold">
+                                          <p:stCondLst>
+                                            <p:cond delay="0"/>
+                                          </p:stCondLst>
+                                        </p:cTn>
+                                        <p:tgtEl>
+                                          <p:spTgt spid="12"/>
+                                        </p:tgtEl>
+                                        <p:attrNameLst>
+                                          <p:attrName>style.visibility</p:attrName>
+                                        </p:attrNameLst>
+                                      </p:cBhvr>
+                                      <p:to>
+                                        <p:strVal val="visible"/>
+                                      </p:to>
+                                    </p:set>
+                                    <p:animEffect transition="in" filter="fade">
+                                      <p:cBhvr>
+                                        <p:cTn id="7" dur="500"/>
+                                        <p:tgtEl>
+                                          <p:spTgt spid="12"/>
+                                        </p:tgtEl>
+                                      </p:cBhvr>
+                                    </p:animEffect>
+                                  </p:childTnLst>
+                                </p:cTn>
+                              </p:par>
+                            </p:childTnLst>
+                          </p:cTn>
+                        </p:par>
+                      </p:childTnLst>
+                    </p:cTn>
+                  </p:par>
+                </p:childTnLst>
+              </p:cTn>
+              <p:prevCondLst>
+                <p:cond evt="onPrev" delay="0">
+                  <p:tgtEl>
+                    <p:sldTgt/>
+                  </p:tgtEl>
+                </p:cond>
+              </p:prevCondLst>
+              <p:nextCondLst>
+                <p:cond evt="onNext" delay="0">
+                  <p:tgtEl>
+                    <p:sldTgt/>
+                  </p:tgtEl>
+                </p:cond>
+              </p:nextCondLst>
+            </p:seq>
+          </p:childTnLst>
+        </p:cTn>
+      </p:par>
+    </p:tnLst>
+    <p:bldLst>
+      <p:bldP spid="12" grpId="0"/>
+    </p:bldLst>
+  </p:timing>
 </p:sld>
 </file>
 
@@ -4247,6 +4615,89 @@
           <p:cNvPr id="2" name="Title 1">
             <a:extLst>
               <a:ext uri="{FF2B5EF4-FFF2-40B4-BE49-F238E27FC236}">
+                <a16:creationId xmlns:a16="http://schemas.microsoft.com/office/drawing/2014/main" id="{52E5C877-FCC4-8B10-50C2-924FFD68CD9A}"/>
+              </a:ext>
+            </a:extLst>
+          </p:cNvPr>
+          <p:cNvSpPr>
+            <a:spLocks noGrp="1"/>
+          </p:cNvSpPr>
+          <p:nvPr>
+            <p:ph type="title"/>
+          </p:nvPr>
+        </p:nvSpPr>
+        <p:spPr/>
+        <p:txBody>
+          <a:bodyPr/>
+          <a:lstStyle/>
+          <a:p>
+            <a:r>
+              <a:rPr lang="en-US" dirty="0"/>
+              <a:t>Convolutional layer</a:t>
+            </a:r>
+          </a:p>
+        </p:txBody>
+      </p:sp>
+      <p:sp>
+        <p:nvSpPr>
+          <p:cNvPr id="3" name="Content Placeholder 2">
+            <a:extLst>
+              <a:ext uri="{FF2B5EF4-FFF2-40B4-BE49-F238E27FC236}">
+                <a16:creationId xmlns:a16="http://schemas.microsoft.com/office/drawing/2014/main" id="{98167828-7134-6384-2712-0B3A039FCF08}"/>
+              </a:ext>
+            </a:extLst>
+          </p:cNvPr>
+          <p:cNvSpPr>
+            <a:spLocks noGrp="1"/>
+          </p:cNvSpPr>
+          <p:nvPr>
+            <p:ph idx="1"/>
+          </p:nvPr>
+        </p:nvSpPr>
+        <p:spPr/>
+        <p:txBody>
+          <a:bodyPr/>
+          <a:lstStyle/>
+          <a:p>
+            <a:endParaRPr lang="en-US"/>
+          </a:p>
+        </p:txBody>
+      </p:sp>
+    </p:spTree>
+    <p:extLst>
+      <p:ext uri="{BB962C8B-B14F-4D97-AF65-F5344CB8AC3E}">
+        <p14:creationId xmlns:p14="http://schemas.microsoft.com/office/powerpoint/2010/main" val="3173564647"/>
+      </p:ext>
+    </p:extLst>
+  </p:cSld>
+  <p:clrMapOvr>
+    <a:masterClrMapping/>
+  </p:clrMapOvr>
+</p:sld>
+</file>
+
+<file path=ppt/slides/slide6.xml><?xml version="1.0" encoding="utf-8"?>
+<p:sld xmlns:a="http://schemas.openxmlformats.org/drawingml/2006/main" xmlns:r="http://schemas.openxmlformats.org/officeDocument/2006/relationships" xmlns:p="http://schemas.openxmlformats.org/presentationml/2006/main">
+  <p:cSld>
+    <p:spTree>
+      <p:nvGrpSpPr>
+        <p:cNvPr id="1" name=""/>
+        <p:cNvGrpSpPr/>
+        <p:nvPr/>
+      </p:nvGrpSpPr>
+      <p:grpSpPr>
+        <a:xfrm>
+          <a:off x="0" y="0"/>
+          <a:ext cx="0" cy="0"/>
+          <a:chOff x="0" y="0"/>
+          <a:chExt cx="0" cy="0"/>
+        </a:xfrm>
+      </p:grpSpPr>
+      <p:sp>
+        <p:nvSpPr>
+          <p:cNvPr id="2" name="Title 1">
+            <a:extLst>
+              <a:ext uri="{FF2B5EF4-FFF2-40B4-BE49-F238E27FC236}">
                 <a16:creationId xmlns:a16="http://schemas.microsoft.com/office/drawing/2014/main" id="{16764117-189B-1877-CA45-9F7123D63B76}"/>
               </a:ext>
             </a:extLst>
@@ -4308,7 +4759,7 @@
 </p:sld>
 </file>
 
-<file path=ppt/slides/slide6.xml><?xml version="1.0" encoding="utf-8"?>
+<file path=ppt/slides/slide7.xml><?xml version="1.0" encoding="utf-8"?>
 <p:sld xmlns:a="http://schemas.openxmlformats.org/drawingml/2006/main" xmlns:r="http://schemas.openxmlformats.org/officeDocument/2006/relationships" xmlns:p="http://schemas.openxmlformats.org/presentationml/2006/main">
   <p:cSld>
     <p:spTree>

</xml_diff>

<commit_message>
added dense layers pb
</commit_message>
<xml_diff>
--- a/Slides_4.pptx
+++ b/Slides_4.pptx
@@ -13,8 +13,9 @@
     <p:sldId id="266" r:id="rId7"/>
     <p:sldId id="267" r:id="rId8"/>
     <p:sldId id="258" r:id="rId9"/>
-    <p:sldId id="260" r:id="rId10"/>
-    <p:sldId id="259" r:id="rId11"/>
+    <p:sldId id="268" r:id="rId10"/>
+    <p:sldId id="260" r:id="rId11"/>
+    <p:sldId id="259" r:id="rId12"/>
   </p:sldIdLst>
   <p:sldSz cx="12192000" cy="6858000"/>
   <p:notesSz cx="6858000" cy="9144000"/>
@@ -3411,6 +3412,89 @@
 </file>
 
 <file path=ppt/slides/slide10.xml><?xml version="1.0" encoding="utf-8"?>
+<p:sld xmlns:a="http://schemas.openxmlformats.org/drawingml/2006/main" xmlns:r="http://schemas.openxmlformats.org/officeDocument/2006/relationships" xmlns:p="http://schemas.openxmlformats.org/presentationml/2006/main">
+  <p:cSld>
+    <p:spTree>
+      <p:nvGrpSpPr>
+        <p:cNvPr id="1" name=""/>
+        <p:cNvGrpSpPr/>
+        <p:nvPr/>
+      </p:nvGrpSpPr>
+      <p:grpSpPr>
+        <a:xfrm>
+          <a:off x="0" y="0"/>
+          <a:ext cx="0" cy="0"/>
+          <a:chOff x="0" y="0"/>
+          <a:chExt cx="0" cy="0"/>
+        </a:xfrm>
+      </p:grpSpPr>
+      <p:sp>
+        <p:nvSpPr>
+          <p:cNvPr id="2" name="Title 1">
+            <a:extLst>
+              <a:ext uri="{FF2B5EF4-FFF2-40B4-BE49-F238E27FC236}">
+                <a16:creationId xmlns:a16="http://schemas.microsoft.com/office/drawing/2014/main" id="{16764117-189B-1877-CA45-9F7123D63B76}"/>
+              </a:ext>
+            </a:extLst>
+          </p:cNvPr>
+          <p:cNvSpPr>
+            <a:spLocks noGrp="1"/>
+          </p:cNvSpPr>
+          <p:nvPr>
+            <p:ph type="title"/>
+          </p:nvPr>
+        </p:nvSpPr>
+        <p:spPr/>
+        <p:txBody>
+          <a:bodyPr/>
+          <a:lstStyle/>
+          <a:p>
+            <a:r>
+              <a:rPr lang="en-US" dirty="0"/>
+              <a:t>Pooling layer</a:t>
+            </a:r>
+          </a:p>
+        </p:txBody>
+      </p:sp>
+      <p:sp>
+        <p:nvSpPr>
+          <p:cNvPr id="3" name="Content Placeholder 2">
+            <a:extLst>
+              <a:ext uri="{FF2B5EF4-FFF2-40B4-BE49-F238E27FC236}">
+                <a16:creationId xmlns:a16="http://schemas.microsoft.com/office/drawing/2014/main" id="{22E0D011-8745-6293-698B-6437B9781305}"/>
+              </a:ext>
+            </a:extLst>
+          </p:cNvPr>
+          <p:cNvSpPr>
+            <a:spLocks noGrp="1"/>
+          </p:cNvSpPr>
+          <p:nvPr>
+            <p:ph idx="1"/>
+          </p:nvPr>
+        </p:nvSpPr>
+        <p:spPr/>
+        <p:txBody>
+          <a:bodyPr/>
+          <a:lstStyle/>
+          <a:p>
+            <a:endParaRPr lang="en-US"/>
+          </a:p>
+        </p:txBody>
+      </p:sp>
+    </p:spTree>
+    <p:extLst>
+      <p:ext uri="{BB962C8B-B14F-4D97-AF65-F5344CB8AC3E}">
+        <p14:creationId xmlns:p14="http://schemas.microsoft.com/office/powerpoint/2010/main" val="1112517747"/>
+      </p:ext>
+    </p:extLst>
+  </p:cSld>
+  <p:clrMapOvr>
+    <a:masterClrMapping/>
+  </p:clrMapOvr>
+</p:sld>
+</file>
+
+<file path=ppt/slides/slide11.xml><?xml version="1.0" encoding="utf-8"?>
 <p:sld xmlns:a="http://schemas.openxmlformats.org/drawingml/2006/main" xmlns:r="http://schemas.openxmlformats.org/officeDocument/2006/relationships" xmlns:p="http://schemas.openxmlformats.org/presentationml/2006/main">
   <p:cSld>
     <p:spTree>
@@ -7711,7 +7795,7 @@
           <p:cNvPr id="2" name="Title 1">
             <a:extLst>
               <a:ext uri="{FF2B5EF4-FFF2-40B4-BE49-F238E27FC236}">
-                <a16:creationId xmlns:a16="http://schemas.microsoft.com/office/drawing/2014/main" id="{16764117-189B-1877-CA45-9F7123D63B76}"/>
+                <a16:creationId xmlns:a16="http://schemas.microsoft.com/office/drawing/2014/main" id="{D8298E56-9D12-BDBD-1B31-D67024B6BBFA}"/>
               </a:ext>
             </a:extLst>
           </p:cNvPr>
@@ -7729,40 +7813,54 @@
           <a:p>
             <a:r>
               <a:rPr lang="en-US" dirty="0"/>
-              <a:t>Pooling layer</a:t>
-            </a:r>
-          </a:p>
-        </p:txBody>
-      </p:sp>
-      <p:sp>
-        <p:nvSpPr>
-          <p:cNvPr id="3" name="Content Placeholder 2">
-            <a:extLst>
-              <a:ext uri="{FF2B5EF4-FFF2-40B4-BE49-F238E27FC236}">
-                <a16:creationId xmlns:a16="http://schemas.microsoft.com/office/drawing/2014/main" id="{22E0D011-8745-6293-698B-6437B9781305}"/>
-              </a:ext>
-            </a:extLst>
-          </p:cNvPr>
-          <p:cNvSpPr>
-            <a:spLocks noGrp="1"/>
-          </p:cNvSpPr>
+              <a:t>What is wrong with </a:t>
+            </a:r>
+            <a:r>
+              <a:rPr lang="en-US"/>
+              <a:t>dense layers?</a:t>
+            </a:r>
+          </a:p>
+        </p:txBody>
+      </p:sp>
+      <p:pic>
+        <p:nvPicPr>
+          <p:cNvPr id="5" name="Content Placeholder 4" descr="Diagram&#10;&#10;Description automatically generated">
+            <a:extLst>
+              <a:ext uri="{FF2B5EF4-FFF2-40B4-BE49-F238E27FC236}">
+                <a16:creationId xmlns:a16="http://schemas.microsoft.com/office/drawing/2014/main" id="{E77D1B06-6218-DA0F-0EAE-78A99E9861E5}"/>
+              </a:ext>
+            </a:extLst>
+          </p:cNvPr>
+          <p:cNvPicPr>
+            <a:picLocks noGrp="1" noChangeAspect="1"/>
+          </p:cNvPicPr>
           <p:nvPr>
             <p:ph idx="1"/>
           </p:nvPr>
-        </p:nvSpPr>
-        <p:spPr/>
-        <p:txBody>
-          <a:bodyPr/>
-          <a:lstStyle/>
-          <a:p>
-            <a:endParaRPr lang="en-US"/>
-          </a:p>
-        </p:txBody>
-      </p:sp>
+        </p:nvPicPr>
+        <p:blipFill>
+          <a:blip r:embed="rId2">
+            <a:extLst>
+              <a:ext uri="{28A0092B-C50C-407E-A947-70E740481C1C}">
+                <a14:useLocalDpi xmlns:a14="http://schemas.microsoft.com/office/drawing/2010/main" val="0"/>
+              </a:ext>
+            </a:extLst>
+          </a:blip>
+          <a:stretch>
+            <a:fillRect/>
+          </a:stretch>
+        </p:blipFill>
+        <p:spPr>
+          <a:xfrm>
+            <a:off x="3461643" y="1825625"/>
+            <a:ext cx="5268713" cy="4351338"/>
+          </a:xfrm>
+        </p:spPr>
+      </p:pic>
     </p:spTree>
     <p:extLst>
       <p:ext uri="{BB962C8B-B14F-4D97-AF65-F5344CB8AC3E}">
-        <p14:creationId xmlns:p14="http://schemas.microsoft.com/office/powerpoint/2010/main" val="1112517747"/>
+        <p14:creationId xmlns:p14="http://schemas.microsoft.com/office/powerpoint/2010/main" val="504622095"/>
       </p:ext>
     </p:extLst>
   </p:cSld>

</xml_diff>